<commit_message>
Export graph as csv, fill part of presentation
</commit_message>
<xml_diff>
--- a/presentation.pptx
+++ b/presentation.pptx
@@ -9,6 +9,8 @@
     <p:sldId id="257" r:id="rId3"/>
     <p:sldId id="258" r:id="rId4"/>
     <p:sldId id="259" r:id="rId5"/>
+    <p:sldId id="261" r:id="rId6"/>
+    <p:sldId id="260" r:id="rId7"/>
   </p:sldIdLst>
   <p:sldSz cx="12192000" cy="6858000"/>
   <p:notesSz cx="6858000" cy="9144000"/>
@@ -262,7 +264,7 @@
           <a:p>
             <a:fld id="{F3AA82F6-6218-4DDD-B92D-270A2F0D85BA}" type="datetimeFigureOut">
               <a:rPr lang="ru-RU" smtClean="0"/>
-              <a:t>06.10.2022</a:t>
+              <a:t>30.12.2022</a:t>
             </a:fld>
             <a:endParaRPr lang="ru-RU"/>
           </a:p>
@@ -460,7 +462,7 @@
           <a:p>
             <a:fld id="{F3AA82F6-6218-4DDD-B92D-270A2F0D85BA}" type="datetimeFigureOut">
               <a:rPr lang="ru-RU" smtClean="0"/>
-              <a:t>06.10.2022</a:t>
+              <a:t>30.12.2022</a:t>
             </a:fld>
             <a:endParaRPr lang="ru-RU"/>
           </a:p>
@@ -668,7 +670,7 @@
           <a:p>
             <a:fld id="{F3AA82F6-6218-4DDD-B92D-270A2F0D85BA}" type="datetimeFigureOut">
               <a:rPr lang="ru-RU" smtClean="0"/>
-              <a:t>06.10.2022</a:t>
+              <a:t>30.12.2022</a:t>
             </a:fld>
             <a:endParaRPr lang="ru-RU"/>
           </a:p>
@@ -866,7 +868,7 @@
           <a:p>
             <a:fld id="{F3AA82F6-6218-4DDD-B92D-270A2F0D85BA}" type="datetimeFigureOut">
               <a:rPr lang="ru-RU" smtClean="0"/>
-              <a:t>06.10.2022</a:t>
+              <a:t>30.12.2022</a:t>
             </a:fld>
             <a:endParaRPr lang="ru-RU"/>
           </a:p>
@@ -1141,7 +1143,7 @@
           <a:p>
             <a:fld id="{F3AA82F6-6218-4DDD-B92D-270A2F0D85BA}" type="datetimeFigureOut">
               <a:rPr lang="ru-RU" smtClean="0"/>
-              <a:t>06.10.2022</a:t>
+              <a:t>30.12.2022</a:t>
             </a:fld>
             <a:endParaRPr lang="ru-RU"/>
           </a:p>
@@ -1406,7 +1408,7 @@
           <a:p>
             <a:fld id="{F3AA82F6-6218-4DDD-B92D-270A2F0D85BA}" type="datetimeFigureOut">
               <a:rPr lang="ru-RU" smtClean="0"/>
-              <a:t>06.10.2022</a:t>
+              <a:t>30.12.2022</a:t>
             </a:fld>
             <a:endParaRPr lang="ru-RU"/>
           </a:p>
@@ -1818,7 +1820,7 @@
           <a:p>
             <a:fld id="{F3AA82F6-6218-4DDD-B92D-270A2F0D85BA}" type="datetimeFigureOut">
               <a:rPr lang="ru-RU" smtClean="0"/>
-              <a:t>06.10.2022</a:t>
+              <a:t>30.12.2022</a:t>
             </a:fld>
             <a:endParaRPr lang="ru-RU"/>
           </a:p>
@@ -1959,7 +1961,7 @@
           <a:p>
             <a:fld id="{F3AA82F6-6218-4DDD-B92D-270A2F0D85BA}" type="datetimeFigureOut">
               <a:rPr lang="ru-RU" smtClean="0"/>
-              <a:t>06.10.2022</a:t>
+              <a:t>30.12.2022</a:t>
             </a:fld>
             <a:endParaRPr lang="ru-RU"/>
           </a:p>
@@ -2072,7 +2074,7 @@
           <a:p>
             <a:fld id="{F3AA82F6-6218-4DDD-B92D-270A2F0D85BA}" type="datetimeFigureOut">
               <a:rPr lang="ru-RU" smtClean="0"/>
-              <a:t>06.10.2022</a:t>
+              <a:t>30.12.2022</a:t>
             </a:fld>
             <a:endParaRPr lang="ru-RU"/>
           </a:p>
@@ -2383,7 +2385,7 @@
           <a:p>
             <a:fld id="{F3AA82F6-6218-4DDD-B92D-270A2F0D85BA}" type="datetimeFigureOut">
               <a:rPr lang="ru-RU" smtClean="0"/>
-              <a:t>06.10.2022</a:t>
+              <a:t>30.12.2022</a:t>
             </a:fld>
             <a:endParaRPr lang="ru-RU"/>
           </a:p>
@@ -2671,7 +2673,7 @@
           <a:p>
             <a:fld id="{F3AA82F6-6218-4DDD-B92D-270A2F0D85BA}" type="datetimeFigureOut">
               <a:rPr lang="ru-RU" smtClean="0"/>
-              <a:t>06.10.2022</a:t>
+              <a:t>30.12.2022</a:t>
             </a:fld>
             <a:endParaRPr lang="ru-RU"/>
           </a:p>
@@ -2912,7 +2914,7 @@
           <a:p>
             <a:fld id="{F3AA82F6-6218-4DDD-B92D-270A2F0D85BA}" type="datetimeFigureOut">
               <a:rPr lang="ru-RU" smtClean="0"/>
-              <a:t>06.10.2022</a:t>
+              <a:t>30.12.2022</a:t>
             </a:fld>
             <a:endParaRPr lang="ru-RU"/>
           </a:p>
@@ -3563,37 +3565,13 @@
           <a:p>
             <a:r>
               <a:rPr lang="ru-RU" dirty="0"/>
-              <a:t>По определённым параметрам (уровень/</a:t>
-            </a:r>
-            <a:r>
-              <a:rPr lang="ru-RU" dirty="0" err="1"/>
-              <a:t>дпм</a:t>
-            </a:r>
+              <a:t>Подбор наиболее результативной техники</a:t>
+            </a:r>
+          </a:p>
+          <a:p>
             <a:r>
               <a:rPr lang="ru-RU" dirty="0"/>
-              <a:t>/альфа страйк/класс/</a:t>
-            </a:r>
-            <a:r>
-              <a:rPr lang="ru-RU" dirty="0" err="1"/>
-              <a:t>винрейт</a:t>
-            </a:r>
-            <a:r>
-              <a:rPr lang="ru-RU" dirty="0"/>
-              <a:t> за месяц…) подобрать танк для игры на нём. </a:t>
-            </a:r>
-          </a:p>
-          <a:p>
-            <a:r>
-              <a:rPr lang="ru-RU" dirty="0"/>
-              <a:t>Пример: пользователь хочет подобрать ТОП-3 тяжелых танка 10 уровня, чтобы у них была перезарядка в диапазоне от 11 до 15 секунд при </a:t>
-            </a:r>
-            <a:r>
-              <a:rPr lang="en-US" dirty="0"/>
-              <a:t>DPM</a:t>
-            </a:r>
-            <a:r>
-              <a:rPr lang="ru-RU" dirty="0"/>
-              <a:t> 2700+ (без учёта оборудования) и средний процент побед за прошедший месяц от 50,5%. </a:t>
+              <a:t>Получение информации о статистике игроков</a:t>
             </a:r>
           </a:p>
         </p:txBody>
@@ -3686,40 +3664,7 @@
           <a:p>
             <a:r>
               <a:rPr lang="en-US" dirty="0"/>
-              <a:t>worldoftanks.ru/</a:t>
-            </a:r>
-            <a:r>
-              <a:rPr lang="en-US" dirty="0" err="1"/>
-              <a:t>ru</a:t>
-            </a:r>
-            <a:r>
-              <a:rPr lang="en-US" dirty="0"/>
-              <a:t>/</a:t>
-            </a:r>
-            <a:r>
-              <a:rPr lang="en-US" dirty="0" err="1"/>
-              <a:t>tankopedia</a:t>
-            </a:r>
-            <a:endParaRPr lang="ru-RU" dirty="0"/>
-          </a:p>
-          <a:p>
-            <a:r>
-              <a:rPr lang="en-US" dirty="0"/>
-              <a:t>kttc.ru/wot/</a:t>
-            </a:r>
-            <a:r>
-              <a:rPr lang="en-US" dirty="0" err="1"/>
-              <a:t>ru</a:t>
-            </a:r>
-            <a:r>
-              <a:rPr lang="en-US" dirty="0"/>
-              <a:t>/</a:t>
-            </a:r>
-          </a:p>
-          <a:p>
-            <a:r>
-              <a:rPr lang="en-US" dirty="0"/>
-              <a:t>wotcharts.eu/ServerAvg</a:t>
+              <a:t>tankireplays.lesta.ru</a:t>
             </a:r>
             <a:endParaRPr lang="ru-RU" dirty="0"/>
           </a:p>
@@ -3757,82 +3702,326 @@
       </p:grpSpPr>
       <p:sp>
         <p:nvSpPr>
-          <p:cNvPr id="2" name="Заголовок 1">
-            <a:extLst>
-              <a:ext uri="{FF2B5EF4-FFF2-40B4-BE49-F238E27FC236}">
-                <a16:creationId xmlns:a16="http://schemas.microsoft.com/office/drawing/2014/main" id="{37F23591-7DF3-D1EF-7370-592DA8B0D8DC}"/>
-              </a:ext>
-            </a:extLst>
-          </p:cNvPr>
-          <p:cNvSpPr>
-            <a:spLocks noGrp="1"/>
-          </p:cNvSpPr>
-          <p:nvPr>
-            <p:ph type="title"/>
-          </p:nvPr>
-        </p:nvSpPr>
-        <p:spPr/>
+          <p:cNvPr id="3" name="Текст 2">
+            <a:extLst>
+              <a:ext uri="{FF2B5EF4-FFF2-40B4-BE49-F238E27FC236}">
+                <a16:creationId xmlns:a16="http://schemas.microsoft.com/office/drawing/2014/main" id="{81A1675C-7D0D-412B-0F57-121D83E85E88}"/>
+              </a:ext>
+            </a:extLst>
+          </p:cNvPr>
+          <p:cNvSpPr>
+            <a:spLocks noGrp="1"/>
+          </p:cNvSpPr>
+          <p:nvPr>
+            <p:ph type="body" idx="1"/>
+          </p:nvPr>
+        </p:nvSpPr>
+        <p:spPr>
+          <a:xfrm>
+            <a:off x="839787" y="402778"/>
+            <a:ext cx="5157787" cy="823912"/>
+          </a:xfrm>
+        </p:spPr>
         <p:txBody>
           <a:bodyPr/>
           <a:lstStyle/>
           <a:p>
             <a:r>
               <a:rPr lang="ru-RU" dirty="0"/>
-              <a:t>Альтернативные области </a:t>
-            </a:r>
-          </a:p>
-        </p:txBody>
-      </p:sp>
-      <p:sp>
-        <p:nvSpPr>
-          <p:cNvPr id="3" name="Объект 2">
-            <a:extLst>
-              <a:ext uri="{FF2B5EF4-FFF2-40B4-BE49-F238E27FC236}">
-                <a16:creationId xmlns:a16="http://schemas.microsoft.com/office/drawing/2014/main" id="{664B836E-DF48-1D46-35F8-2E6FC91965E2}"/>
-              </a:ext>
-            </a:extLst>
-          </p:cNvPr>
-          <p:cNvSpPr>
-            <a:spLocks noGrp="1"/>
-          </p:cNvSpPr>
-          <p:nvPr>
-            <p:ph idx="1"/>
-          </p:nvPr>
-        </p:nvSpPr>
-        <p:spPr/>
+              <a:t>Сценарий использования</a:t>
+            </a:r>
+          </a:p>
+        </p:txBody>
+      </p:sp>
+      <p:sp>
+        <p:nvSpPr>
+          <p:cNvPr id="4" name="Объект 3">
+            <a:extLst>
+              <a:ext uri="{FF2B5EF4-FFF2-40B4-BE49-F238E27FC236}">
+                <a16:creationId xmlns:a16="http://schemas.microsoft.com/office/drawing/2014/main" id="{9401834E-AF39-467B-C5E6-F2919A3468E5}"/>
+              </a:ext>
+            </a:extLst>
+          </p:cNvPr>
+          <p:cNvSpPr>
+            <a:spLocks noGrp="1"/>
+          </p:cNvSpPr>
+          <p:nvPr>
+            <p:ph sz="half" idx="2"/>
+          </p:nvPr>
+        </p:nvSpPr>
+        <p:spPr>
+          <a:xfrm>
+            <a:off x="836612" y="1571348"/>
+            <a:ext cx="5160963" cy="4618315"/>
+          </a:xfrm>
+        </p:spPr>
         <p:txBody>
           <a:bodyPr/>
           <a:lstStyle/>
           <a:p>
             <a:r>
               <a:rPr lang="ru-RU" dirty="0"/>
-              <a:t>Скалолазание</a:t>
-            </a:r>
-          </a:p>
+              <a:t>Подобрать танк для прокачки, опираясь на информацию о его показателях в статистике игроков и боёв</a:t>
+            </a:r>
+          </a:p>
+        </p:txBody>
+      </p:sp>
+      <p:sp>
+        <p:nvSpPr>
+          <p:cNvPr id="5" name="Текст 4">
+            <a:extLst>
+              <a:ext uri="{FF2B5EF4-FFF2-40B4-BE49-F238E27FC236}">
+                <a16:creationId xmlns:a16="http://schemas.microsoft.com/office/drawing/2014/main" id="{41469EF7-B550-7F05-77C6-42F4644BB46F}"/>
+              </a:ext>
+            </a:extLst>
+          </p:cNvPr>
+          <p:cNvSpPr>
+            <a:spLocks noGrp="1"/>
+          </p:cNvSpPr>
+          <p:nvPr>
+            <p:ph type="body" sz="quarter" idx="3"/>
+          </p:nvPr>
+        </p:nvSpPr>
+        <p:spPr>
+          <a:xfrm>
+            <a:off x="6172200" y="402778"/>
+            <a:ext cx="5183188" cy="823912"/>
+          </a:xfrm>
+        </p:spPr>
+        <p:txBody>
+          <a:bodyPr/>
+          <a:lstStyle/>
           <a:p>
             <a:r>
               <a:rPr lang="ru-RU" dirty="0"/>
-              <a:t>Альпинизм</a:t>
-            </a:r>
-          </a:p>
-          <a:p>
-            <a:r>
-              <a:rPr lang="ru-RU" dirty="0"/>
-              <a:t>Аниме</a:t>
-            </a:r>
-          </a:p>
-          <a:p>
-            <a:r>
-              <a:rPr lang="ru-RU" dirty="0"/>
-              <a:t>Аграрные и животноводческие хозяйства/предприятия</a:t>
-            </a:r>
+              <a:t>Целевая аудитория</a:t>
+            </a:r>
+          </a:p>
+        </p:txBody>
+      </p:sp>
+      <p:sp>
+        <p:nvSpPr>
+          <p:cNvPr id="6" name="Объект 5">
+            <a:extLst>
+              <a:ext uri="{FF2B5EF4-FFF2-40B4-BE49-F238E27FC236}">
+                <a16:creationId xmlns:a16="http://schemas.microsoft.com/office/drawing/2014/main" id="{B902B134-E81A-1DA4-BDBD-9BF003AFDDE0}"/>
+              </a:ext>
+            </a:extLst>
+          </p:cNvPr>
+          <p:cNvSpPr>
+            <a:spLocks noGrp="1"/>
+          </p:cNvSpPr>
+          <p:nvPr>
+            <p:ph sz="quarter" idx="4"/>
+          </p:nvPr>
+        </p:nvSpPr>
+        <p:spPr>
+          <a:xfrm>
+            <a:off x="6172200" y="1571348"/>
+            <a:ext cx="5183188" cy="4618315"/>
+          </a:xfrm>
+        </p:spPr>
+        <p:txBody>
+          <a:bodyPr/>
+          <a:lstStyle/>
+          <a:p>
+            <a:endParaRPr lang="ru-RU" dirty="0"/>
           </a:p>
         </p:txBody>
       </p:sp>
     </p:spTree>
     <p:extLst>
       <p:ext uri="{BB962C8B-B14F-4D97-AF65-F5344CB8AC3E}">
-        <p14:creationId xmlns:p14="http://schemas.microsoft.com/office/powerpoint/2010/main" val="4171205555"/>
+        <p14:creationId xmlns:p14="http://schemas.microsoft.com/office/powerpoint/2010/main" val="2111200118"/>
+      </p:ext>
+    </p:extLst>
+  </p:cSld>
+  <p:clrMapOvr>
+    <a:masterClrMapping/>
+  </p:clrMapOvr>
+</p:sld>
+</file>
+
+<file path=ppt/slides/slide5.xml><?xml version="1.0" encoding="utf-8"?>
+<p:sld xmlns:a="http://schemas.openxmlformats.org/drawingml/2006/main" xmlns:r="http://schemas.openxmlformats.org/officeDocument/2006/relationships" xmlns:p="http://schemas.openxmlformats.org/presentationml/2006/main">
+  <p:cSld>
+    <p:spTree>
+      <p:nvGrpSpPr>
+        <p:cNvPr id="1" name=""/>
+        <p:cNvGrpSpPr/>
+        <p:nvPr/>
+      </p:nvGrpSpPr>
+      <p:grpSpPr>
+        <a:xfrm>
+          <a:off x="0" y="0"/>
+          <a:ext cx="0" cy="0"/>
+          <a:chOff x="0" y="0"/>
+          <a:chExt cx="0" cy="0"/>
+        </a:xfrm>
+      </p:grpSpPr>
+      <p:sp>
+        <p:nvSpPr>
+          <p:cNvPr id="2" name="Заголовок 1">
+            <a:extLst>
+              <a:ext uri="{FF2B5EF4-FFF2-40B4-BE49-F238E27FC236}">
+                <a16:creationId xmlns:a16="http://schemas.microsoft.com/office/drawing/2014/main" id="{F0605CB6-1AD3-3B0E-7E11-945965CB8063}"/>
+              </a:ext>
+            </a:extLst>
+          </p:cNvPr>
+          <p:cNvSpPr>
+            <a:spLocks noGrp="1"/>
+          </p:cNvSpPr>
+          <p:nvPr>
+            <p:ph type="title"/>
+          </p:nvPr>
+        </p:nvSpPr>
+        <p:spPr>
+          <a:xfrm>
+            <a:off x="838200" y="365125"/>
+            <a:ext cx="10515600" cy="806727"/>
+          </a:xfrm>
+        </p:spPr>
+        <p:txBody>
+          <a:bodyPr/>
+          <a:lstStyle/>
+          <a:p>
+            <a:r>
+              <a:rPr lang="ru-RU" dirty="0"/>
+              <a:t>Визуализация графа</a:t>
+            </a:r>
+          </a:p>
+        </p:txBody>
+      </p:sp>
+      <p:pic>
+        <p:nvPicPr>
+          <p:cNvPr id="7" name="Объект 6">
+            <a:extLst>
+              <a:ext uri="{FF2B5EF4-FFF2-40B4-BE49-F238E27FC236}">
+                <a16:creationId xmlns:a16="http://schemas.microsoft.com/office/drawing/2014/main" id="{70A59C02-8B71-9906-01A8-3E2B353DD6F0}"/>
+              </a:ext>
+            </a:extLst>
+          </p:cNvPr>
+          <p:cNvPicPr>
+            <a:picLocks noGrp="1" noChangeAspect="1"/>
+          </p:cNvPicPr>
+          <p:nvPr>
+            <p:ph idx="1"/>
+          </p:nvPr>
+        </p:nvPicPr>
+        <p:blipFill rotWithShape="1">
+          <a:blip r:embed="rId2">
+            <a:extLst>
+              <a:ext uri="{28A0092B-C50C-407E-A947-70E740481C1C}">
+                <a14:useLocalDpi xmlns:a14="http://schemas.microsoft.com/office/drawing/2010/main" val="0"/>
+              </a:ext>
+            </a:extLst>
+          </a:blip>
+          <a:srcRect l="21330" t="11364" r="24659" b="11321"/>
+          <a:stretch/>
+        </p:blipFill>
+        <p:spPr>
+          <a:xfrm>
+            <a:off x="1989193" y="0"/>
+            <a:ext cx="8377215" cy="6945343"/>
+          </a:xfrm>
+        </p:spPr>
+      </p:pic>
+    </p:spTree>
+    <p:extLst>
+      <p:ext uri="{BB962C8B-B14F-4D97-AF65-F5344CB8AC3E}">
+        <p14:creationId xmlns:p14="http://schemas.microsoft.com/office/powerpoint/2010/main" val="1728274325"/>
+      </p:ext>
+    </p:extLst>
+  </p:cSld>
+  <p:clrMapOvr>
+    <a:masterClrMapping/>
+  </p:clrMapOvr>
+</p:sld>
+</file>
+
+<file path=ppt/slides/slide6.xml><?xml version="1.0" encoding="utf-8"?>
+<p:sld xmlns:a="http://schemas.openxmlformats.org/drawingml/2006/main" xmlns:r="http://schemas.openxmlformats.org/officeDocument/2006/relationships" xmlns:p="http://schemas.openxmlformats.org/presentationml/2006/main">
+  <p:cSld>
+    <p:spTree>
+      <p:nvGrpSpPr>
+        <p:cNvPr id="1" name=""/>
+        <p:cNvGrpSpPr/>
+        <p:nvPr/>
+      </p:nvGrpSpPr>
+      <p:grpSpPr>
+        <a:xfrm>
+          <a:off x="0" y="0"/>
+          <a:ext cx="0" cy="0"/>
+          <a:chOff x="0" y="0"/>
+          <a:chExt cx="0" cy="0"/>
+        </a:xfrm>
+      </p:grpSpPr>
+      <p:sp>
+        <p:nvSpPr>
+          <p:cNvPr id="2" name="Заголовок 1">
+            <a:extLst>
+              <a:ext uri="{FF2B5EF4-FFF2-40B4-BE49-F238E27FC236}">
+                <a16:creationId xmlns:a16="http://schemas.microsoft.com/office/drawing/2014/main" id="{F0605CB6-1AD3-3B0E-7E11-945965CB8063}"/>
+              </a:ext>
+            </a:extLst>
+          </p:cNvPr>
+          <p:cNvSpPr>
+            <a:spLocks noGrp="1"/>
+          </p:cNvSpPr>
+          <p:nvPr>
+            <p:ph type="title"/>
+          </p:nvPr>
+        </p:nvSpPr>
+        <p:spPr>
+          <a:xfrm>
+            <a:off x="838200" y="365125"/>
+            <a:ext cx="10515600" cy="806727"/>
+          </a:xfrm>
+        </p:spPr>
+        <p:txBody>
+          <a:bodyPr/>
+          <a:lstStyle/>
+          <a:p>
+            <a:r>
+              <a:rPr lang="ru-RU" dirty="0"/>
+              <a:t>Документация</a:t>
+            </a:r>
+          </a:p>
+        </p:txBody>
+      </p:sp>
+      <p:pic>
+        <p:nvPicPr>
+          <p:cNvPr id="5" name="Объект 4">
+            <a:extLst>
+              <a:ext uri="{FF2B5EF4-FFF2-40B4-BE49-F238E27FC236}">
+                <a16:creationId xmlns:a16="http://schemas.microsoft.com/office/drawing/2014/main" id="{AD01CF45-172D-A8C7-217F-8DE41B7F5260}"/>
+              </a:ext>
+            </a:extLst>
+          </p:cNvPr>
+          <p:cNvPicPr>
+            <a:picLocks noGrp="1" noChangeAspect="1"/>
+          </p:cNvPicPr>
+          <p:nvPr>
+            <p:ph idx="1"/>
+          </p:nvPr>
+        </p:nvPicPr>
+        <p:blipFill>
+          <a:blip r:embed="rId2"/>
+          <a:stretch>
+            <a:fillRect/>
+          </a:stretch>
+        </p:blipFill>
+        <p:spPr>
+          <a:xfrm>
+            <a:off x="997047" y="1233996"/>
+            <a:ext cx="10197906" cy="5184560"/>
+          </a:xfrm>
+        </p:spPr>
+      </p:pic>
+    </p:spTree>
+    <p:extLst>
+      <p:ext uri="{BB962C8B-B14F-4D97-AF65-F5344CB8AC3E}">
+        <p14:creationId xmlns:p14="http://schemas.microsoft.com/office/powerpoint/2010/main" val="147924703"/>
       </p:ext>
     </p:extLst>
   </p:cSld>

</xml_diff>

<commit_message>
Finalize presentation, add embedings notebook
</commit_message>
<xml_diff>
--- a/presentation.pptx
+++ b/presentation.pptx
@@ -11,6 +11,13 @@
     <p:sldId id="259" r:id="rId5"/>
     <p:sldId id="261" r:id="rId6"/>
     <p:sldId id="260" r:id="rId7"/>
+    <p:sldId id="262" r:id="rId8"/>
+    <p:sldId id="263" r:id="rId9"/>
+    <p:sldId id="264" r:id="rId10"/>
+    <p:sldId id="265" r:id="rId11"/>
+    <p:sldId id="266" r:id="rId12"/>
+    <p:sldId id="267" r:id="rId13"/>
+    <p:sldId id="268" r:id="rId14"/>
   </p:sldIdLst>
   <p:sldSz cx="12192000" cy="6858000"/>
   <p:notesSz cx="6858000" cy="9144000"/>
@@ -3497,6 +3504,410 @@
 </p:sld>
 </file>
 
+<file path=ppt/slides/slide10.xml><?xml version="1.0" encoding="utf-8"?>
+<p:sld xmlns:a="http://schemas.openxmlformats.org/drawingml/2006/main" xmlns:r="http://schemas.openxmlformats.org/officeDocument/2006/relationships" xmlns:p="http://schemas.openxmlformats.org/presentationml/2006/main">
+  <p:cSld>
+    <p:spTree>
+      <p:nvGrpSpPr>
+        <p:cNvPr id="1" name=""/>
+        <p:cNvGrpSpPr/>
+        <p:nvPr/>
+      </p:nvGrpSpPr>
+      <p:grpSpPr>
+        <a:xfrm>
+          <a:off x="0" y="0"/>
+          <a:ext cx="0" cy="0"/>
+          <a:chOff x="0" y="0"/>
+          <a:chExt cx="0" cy="0"/>
+        </a:xfrm>
+      </p:grpSpPr>
+      <p:sp>
+        <p:nvSpPr>
+          <p:cNvPr id="2" name="Заголовок 1">
+            <a:extLst>
+              <a:ext uri="{FF2B5EF4-FFF2-40B4-BE49-F238E27FC236}">
+                <a16:creationId xmlns:a16="http://schemas.microsoft.com/office/drawing/2014/main" id="{9FD8B6ED-77EE-5154-4C0A-137FC9A448BE}"/>
+              </a:ext>
+            </a:extLst>
+          </p:cNvPr>
+          <p:cNvSpPr>
+            <a:spLocks noGrp="1"/>
+          </p:cNvSpPr>
+          <p:nvPr>
+            <p:ph type="title"/>
+          </p:nvPr>
+        </p:nvSpPr>
+        <p:spPr/>
+        <p:txBody>
+          <a:bodyPr/>
+          <a:lstStyle/>
+          <a:p>
+            <a:r>
+              <a:rPr lang="en-US" dirty="0"/>
+              <a:t>SPARQL </a:t>
+            </a:r>
+            <a:r>
+              <a:rPr lang="ru-RU" dirty="0"/>
+              <a:t>запросы</a:t>
+            </a:r>
+          </a:p>
+        </p:txBody>
+      </p:sp>
+      <p:pic>
+        <p:nvPicPr>
+          <p:cNvPr id="7" name="Объект 6">
+            <a:extLst>
+              <a:ext uri="{FF2B5EF4-FFF2-40B4-BE49-F238E27FC236}">
+                <a16:creationId xmlns:a16="http://schemas.microsoft.com/office/drawing/2014/main" id="{06784355-7A76-11A6-4D0B-D0D41E4481C0}"/>
+              </a:ext>
+            </a:extLst>
+          </p:cNvPr>
+          <p:cNvPicPr>
+            <a:picLocks noGrp="1" noChangeAspect="1"/>
+          </p:cNvPicPr>
+          <p:nvPr>
+            <p:ph idx="1"/>
+          </p:nvPr>
+        </p:nvPicPr>
+        <p:blipFill>
+          <a:blip r:embed="rId2"/>
+          <a:stretch>
+            <a:fillRect/>
+          </a:stretch>
+        </p:blipFill>
+        <p:spPr>
+          <a:xfrm>
+            <a:off x="2057503" y="1825625"/>
+            <a:ext cx="8076994" cy="4351338"/>
+          </a:xfrm>
+        </p:spPr>
+      </p:pic>
+    </p:spTree>
+    <p:extLst>
+      <p:ext uri="{BB962C8B-B14F-4D97-AF65-F5344CB8AC3E}">
+        <p14:creationId xmlns:p14="http://schemas.microsoft.com/office/powerpoint/2010/main" val="533378816"/>
+      </p:ext>
+    </p:extLst>
+  </p:cSld>
+  <p:clrMapOvr>
+    <a:masterClrMapping/>
+  </p:clrMapOvr>
+</p:sld>
+</file>
+
+<file path=ppt/slides/slide11.xml><?xml version="1.0" encoding="utf-8"?>
+<p:sld xmlns:a="http://schemas.openxmlformats.org/drawingml/2006/main" xmlns:r="http://schemas.openxmlformats.org/officeDocument/2006/relationships" xmlns:p="http://schemas.openxmlformats.org/presentationml/2006/main">
+  <p:cSld>
+    <p:spTree>
+      <p:nvGrpSpPr>
+        <p:cNvPr id="1" name=""/>
+        <p:cNvGrpSpPr/>
+        <p:nvPr/>
+      </p:nvGrpSpPr>
+      <p:grpSpPr>
+        <a:xfrm>
+          <a:off x="0" y="0"/>
+          <a:ext cx="0" cy="0"/>
+          <a:chOff x="0" y="0"/>
+          <a:chExt cx="0" cy="0"/>
+        </a:xfrm>
+      </p:grpSpPr>
+      <p:sp>
+        <p:nvSpPr>
+          <p:cNvPr id="2" name="Заголовок 1">
+            <a:extLst>
+              <a:ext uri="{FF2B5EF4-FFF2-40B4-BE49-F238E27FC236}">
+                <a16:creationId xmlns:a16="http://schemas.microsoft.com/office/drawing/2014/main" id="{9FD8B6ED-77EE-5154-4C0A-137FC9A448BE}"/>
+              </a:ext>
+            </a:extLst>
+          </p:cNvPr>
+          <p:cNvSpPr>
+            <a:spLocks noGrp="1"/>
+          </p:cNvSpPr>
+          <p:nvPr>
+            <p:ph type="title"/>
+          </p:nvPr>
+        </p:nvSpPr>
+        <p:spPr/>
+        <p:txBody>
+          <a:bodyPr/>
+          <a:lstStyle/>
+          <a:p>
+            <a:r>
+              <a:rPr lang="en-US" dirty="0"/>
+              <a:t>SPARQL </a:t>
+            </a:r>
+            <a:r>
+              <a:rPr lang="ru-RU" dirty="0"/>
+              <a:t>запросы</a:t>
+            </a:r>
+          </a:p>
+        </p:txBody>
+      </p:sp>
+      <p:pic>
+        <p:nvPicPr>
+          <p:cNvPr id="7" name="Объект 6">
+            <a:extLst>
+              <a:ext uri="{FF2B5EF4-FFF2-40B4-BE49-F238E27FC236}">
+                <a16:creationId xmlns:a16="http://schemas.microsoft.com/office/drawing/2014/main" id="{9BAB887F-C2A3-4026-4196-FDAE69DE1FAB}"/>
+              </a:ext>
+            </a:extLst>
+          </p:cNvPr>
+          <p:cNvPicPr>
+            <a:picLocks noGrp="1" noChangeAspect="1"/>
+          </p:cNvPicPr>
+          <p:nvPr>
+            <p:ph idx="1"/>
+          </p:nvPr>
+        </p:nvPicPr>
+        <p:blipFill>
+          <a:blip r:embed="rId2"/>
+          <a:stretch>
+            <a:fillRect/>
+          </a:stretch>
+        </p:blipFill>
+        <p:spPr>
+          <a:xfrm>
+            <a:off x="2542687" y="1825625"/>
+            <a:ext cx="7106625" cy="4351338"/>
+          </a:xfrm>
+        </p:spPr>
+      </p:pic>
+    </p:spTree>
+    <p:extLst>
+      <p:ext uri="{BB962C8B-B14F-4D97-AF65-F5344CB8AC3E}">
+        <p14:creationId xmlns:p14="http://schemas.microsoft.com/office/powerpoint/2010/main" val="3378826972"/>
+      </p:ext>
+    </p:extLst>
+  </p:cSld>
+  <p:clrMapOvr>
+    <a:masterClrMapping/>
+  </p:clrMapOvr>
+</p:sld>
+</file>
+
+<file path=ppt/slides/slide12.xml><?xml version="1.0" encoding="utf-8"?>
+<p:sld xmlns:a="http://schemas.openxmlformats.org/drawingml/2006/main" xmlns:r="http://schemas.openxmlformats.org/officeDocument/2006/relationships" xmlns:p="http://schemas.openxmlformats.org/presentationml/2006/main">
+  <p:cSld>
+    <p:spTree>
+      <p:nvGrpSpPr>
+        <p:cNvPr id="1" name=""/>
+        <p:cNvGrpSpPr/>
+        <p:nvPr/>
+      </p:nvGrpSpPr>
+      <p:grpSpPr>
+        <a:xfrm>
+          <a:off x="0" y="0"/>
+          <a:ext cx="0" cy="0"/>
+          <a:chOff x="0" y="0"/>
+          <a:chExt cx="0" cy="0"/>
+        </a:xfrm>
+      </p:grpSpPr>
+      <p:sp>
+        <p:nvSpPr>
+          <p:cNvPr id="2" name="Заголовок 1">
+            <a:extLst>
+              <a:ext uri="{FF2B5EF4-FFF2-40B4-BE49-F238E27FC236}">
+                <a16:creationId xmlns:a16="http://schemas.microsoft.com/office/drawing/2014/main" id="{9FD8B6ED-77EE-5154-4C0A-137FC9A448BE}"/>
+              </a:ext>
+            </a:extLst>
+          </p:cNvPr>
+          <p:cNvSpPr>
+            <a:spLocks noGrp="1"/>
+          </p:cNvSpPr>
+          <p:nvPr>
+            <p:ph type="title"/>
+          </p:nvPr>
+        </p:nvSpPr>
+        <p:spPr/>
+        <p:txBody>
+          <a:bodyPr/>
+          <a:lstStyle/>
+          <a:p>
+            <a:r>
+              <a:rPr lang="en-US" dirty="0"/>
+              <a:t>SPARQL </a:t>
+            </a:r>
+            <a:r>
+              <a:rPr lang="ru-RU" dirty="0"/>
+              <a:t>запросы</a:t>
+            </a:r>
+          </a:p>
+        </p:txBody>
+      </p:sp>
+      <p:pic>
+        <p:nvPicPr>
+          <p:cNvPr id="9" name="Объект 8">
+            <a:extLst>
+              <a:ext uri="{FF2B5EF4-FFF2-40B4-BE49-F238E27FC236}">
+                <a16:creationId xmlns:a16="http://schemas.microsoft.com/office/drawing/2014/main" id="{7331E7C8-39FA-1EFB-587C-3235C3C8E3A2}"/>
+              </a:ext>
+            </a:extLst>
+          </p:cNvPr>
+          <p:cNvPicPr>
+            <a:picLocks noGrp="1" noChangeAspect="1"/>
+          </p:cNvPicPr>
+          <p:nvPr>
+            <p:ph idx="1"/>
+          </p:nvPr>
+        </p:nvPicPr>
+        <p:blipFill>
+          <a:blip r:embed="rId2"/>
+          <a:stretch>
+            <a:fillRect/>
+          </a:stretch>
+        </p:blipFill>
+        <p:spPr>
+          <a:xfrm>
+            <a:off x="2143612" y="1825625"/>
+            <a:ext cx="7904775" cy="4351338"/>
+          </a:xfrm>
+        </p:spPr>
+      </p:pic>
+    </p:spTree>
+    <p:extLst>
+      <p:ext uri="{BB962C8B-B14F-4D97-AF65-F5344CB8AC3E}">
+        <p14:creationId xmlns:p14="http://schemas.microsoft.com/office/powerpoint/2010/main" val="2890330516"/>
+      </p:ext>
+    </p:extLst>
+  </p:cSld>
+  <p:clrMapOvr>
+    <a:masterClrMapping/>
+  </p:clrMapOvr>
+</p:sld>
+</file>
+
+<file path=ppt/slides/slide13.xml><?xml version="1.0" encoding="utf-8"?>
+<p:sld xmlns:a="http://schemas.openxmlformats.org/drawingml/2006/main" xmlns:r="http://schemas.openxmlformats.org/officeDocument/2006/relationships" xmlns:p="http://schemas.openxmlformats.org/presentationml/2006/main">
+  <p:cSld>
+    <p:spTree>
+      <p:nvGrpSpPr>
+        <p:cNvPr id="1" name=""/>
+        <p:cNvGrpSpPr/>
+        <p:nvPr/>
+      </p:nvGrpSpPr>
+      <p:grpSpPr>
+        <a:xfrm>
+          <a:off x="0" y="0"/>
+          <a:ext cx="0" cy="0"/>
+          <a:chOff x="0" y="0"/>
+          <a:chExt cx="0" cy="0"/>
+        </a:xfrm>
+      </p:grpSpPr>
+      <p:sp>
+        <p:nvSpPr>
+          <p:cNvPr id="2" name="Заголовок 1">
+            <a:extLst>
+              <a:ext uri="{FF2B5EF4-FFF2-40B4-BE49-F238E27FC236}">
+                <a16:creationId xmlns:a16="http://schemas.microsoft.com/office/drawing/2014/main" id="{C3B63108-2FEC-1B98-12CC-090C9D325309}"/>
+              </a:ext>
+            </a:extLst>
+          </p:cNvPr>
+          <p:cNvSpPr>
+            <a:spLocks noGrp="1"/>
+          </p:cNvSpPr>
+          <p:nvPr>
+            <p:ph type="title"/>
+          </p:nvPr>
+        </p:nvSpPr>
+        <p:spPr>
+          <a:xfrm>
+            <a:off x="838200" y="365125"/>
+            <a:ext cx="10515600" cy="703915"/>
+          </a:xfrm>
+        </p:spPr>
+        <p:txBody>
+          <a:bodyPr/>
+          <a:lstStyle/>
+          <a:p>
+            <a:r>
+              <a:rPr lang="ru-RU" dirty="0" err="1"/>
+              <a:t>Графовые</a:t>
+            </a:r>
+            <a:r>
+              <a:rPr lang="ru-RU" dirty="0"/>
+              <a:t> </a:t>
+            </a:r>
+            <a:r>
+              <a:rPr lang="ru-RU" dirty="0" err="1"/>
+              <a:t>эмбединги</a:t>
+            </a:r>
+            <a:endParaRPr lang="ru-RU" dirty="0"/>
+          </a:p>
+        </p:txBody>
+      </p:sp>
+      <p:pic>
+        <p:nvPicPr>
+          <p:cNvPr id="8" name="Объект 7">
+            <a:extLst>
+              <a:ext uri="{FF2B5EF4-FFF2-40B4-BE49-F238E27FC236}">
+                <a16:creationId xmlns:a16="http://schemas.microsoft.com/office/drawing/2014/main" id="{875CE728-5C6C-CEFE-983B-144A5F144A9F}"/>
+              </a:ext>
+            </a:extLst>
+          </p:cNvPr>
+          <p:cNvPicPr>
+            <a:picLocks noGrp="1" noChangeAspect="1"/>
+          </p:cNvPicPr>
+          <p:nvPr>
+            <p:ph sz="half" idx="2"/>
+          </p:nvPr>
+        </p:nvPicPr>
+        <p:blipFill>
+          <a:blip r:embed="rId2"/>
+          <a:stretch>
+            <a:fillRect/>
+          </a:stretch>
+        </p:blipFill>
+        <p:spPr>
+          <a:xfrm>
+            <a:off x="1462374" y="4348488"/>
+            <a:ext cx="9454541" cy="2309763"/>
+          </a:xfrm>
+        </p:spPr>
+      </p:pic>
+      <p:pic>
+        <p:nvPicPr>
+          <p:cNvPr id="16" name="Рисунок 15">
+            <a:extLst>
+              <a:ext uri="{FF2B5EF4-FFF2-40B4-BE49-F238E27FC236}">
+                <a16:creationId xmlns:a16="http://schemas.microsoft.com/office/drawing/2014/main" id="{051D143D-264E-3E37-B4AF-AE1F45A847EA}"/>
+              </a:ext>
+            </a:extLst>
+          </p:cNvPr>
+          <p:cNvPicPr>
+            <a:picLocks noChangeAspect="1"/>
+          </p:cNvPicPr>
+          <p:nvPr/>
+        </p:nvPicPr>
+        <p:blipFill>
+          <a:blip r:embed="rId3"/>
+          <a:stretch>
+            <a:fillRect/>
+          </a:stretch>
+        </p:blipFill>
+        <p:spPr>
+          <a:xfrm>
+            <a:off x="676446" y="1004526"/>
+            <a:ext cx="5156183" cy="3255060"/>
+          </a:xfrm>
+          <a:prstGeom prst="rect">
+            <a:avLst/>
+          </a:prstGeom>
+        </p:spPr>
+      </p:pic>
+    </p:spTree>
+    <p:extLst>
+      <p:ext uri="{BB962C8B-B14F-4D97-AF65-F5344CB8AC3E}">
+        <p14:creationId xmlns:p14="http://schemas.microsoft.com/office/powerpoint/2010/main" val="713335298"/>
+      </p:ext>
+    </p:extLst>
+  </p:cSld>
+  <p:clrMapOvr>
+    <a:masterClrMapping/>
+  </p:clrMapOvr>
+</p:sld>
+</file>
+
 <file path=ppt/slides/slide2.xml><?xml version="1.0" encoding="utf-8"?>
 <p:sld xmlns:a="http://schemas.openxmlformats.org/drawingml/2006/main" xmlns:r="http://schemas.openxmlformats.org/officeDocument/2006/relationships" xmlns:p="http://schemas.openxmlformats.org/presentationml/2006/main">
   <p:cSld>
@@ -3657,7 +4068,7 @@
           <a:p>
             <a:r>
               <a:rPr lang="en-US" dirty="0"/>
-              <a:t>developers.wargaming.net</a:t>
+              <a:t>developers.lesta.ru</a:t>
             </a:r>
             <a:endParaRPr lang="ru-RU" dirty="0"/>
           </a:p>
@@ -4022,6 +4433,333 @@
     <p:extLst>
       <p:ext uri="{BB962C8B-B14F-4D97-AF65-F5344CB8AC3E}">
         <p14:creationId xmlns:p14="http://schemas.microsoft.com/office/powerpoint/2010/main" val="147924703"/>
+      </p:ext>
+    </p:extLst>
+  </p:cSld>
+  <p:clrMapOvr>
+    <a:masterClrMapping/>
+  </p:clrMapOvr>
+</p:sld>
+</file>
+
+<file path=ppt/slides/slide7.xml><?xml version="1.0" encoding="utf-8"?>
+<p:sld xmlns:a="http://schemas.openxmlformats.org/drawingml/2006/main" xmlns:r="http://schemas.openxmlformats.org/officeDocument/2006/relationships" xmlns:p="http://schemas.openxmlformats.org/presentationml/2006/main">
+  <p:cSld>
+    <p:spTree>
+      <p:nvGrpSpPr>
+        <p:cNvPr id="1" name=""/>
+        <p:cNvGrpSpPr/>
+        <p:nvPr/>
+      </p:nvGrpSpPr>
+      <p:grpSpPr>
+        <a:xfrm>
+          <a:off x="0" y="0"/>
+          <a:ext cx="0" cy="0"/>
+          <a:chOff x="0" y="0"/>
+          <a:chExt cx="0" cy="0"/>
+        </a:xfrm>
+      </p:grpSpPr>
+      <p:sp>
+        <p:nvSpPr>
+          <p:cNvPr id="2" name="Заголовок 1">
+            <a:extLst>
+              <a:ext uri="{FF2B5EF4-FFF2-40B4-BE49-F238E27FC236}">
+                <a16:creationId xmlns:a16="http://schemas.microsoft.com/office/drawing/2014/main" id="{5B6E4074-01DB-A53F-B27A-3EF1FD070B45}"/>
+              </a:ext>
+            </a:extLst>
+          </p:cNvPr>
+          <p:cNvSpPr>
+            <a:spLocks noGrp="1"/>
+          </p:cNvSpPr>
+          <p:nvPr>
+            <p:ph type="title"/>
+          </p:nvPr>
+        </p:nvSpPr>
+        <p:spPr/>
+        <p:txBody>
+          <a:bodyPr/>
+          <a:lstStyle/>
+          <a:p>
+            <a:r>
+              <a:rPr lang="ru-RU" dirty="0"/>
+              <a:t>Компетентностные вопросы</a:t>
+            </a:r>
+          </a:p>
+        </p:txBody>
+      </p:sp>
+      <p:sp>
+        <p:nvSpPr>
+          <p:cNvPr id="3" name="Объект 2">
+            <a:extLst>
+              <a:ext uri="{FF2B5EF4-FFF2-40B4-BE49-F238E27FC236}">
+                <a16:creationId xmlns:a16="http://schemas.microsoft.com/office/drawing/2014/main" id="{B08DA1A3-7408-0487-2100-31C01825E234}"/>
+              </a:ext>
+            </a:extLst>
+          </p:cNvPr>
+          <p:cNvSpPr>
+            <a:spLocks noGrp="1"/>
+          </p:cNvSpPr>
+          <p:nvPr>
+            <p:ph idx="1"/>
+          </p:nvPr>
+        </p:nvSpPr>
+        <p:spPr/>
+        <p:txBody>
+          <a:bodyPr/>
+          <a:lstStyle/>
+          <a:p>
+            <a:pPr algn="l">
+              <a:buFont typeface="+mj-lt"/>
+              <a:buAutoNum type="arabicPeriod"/>
+            </a:pPr>
+            <a:r>
+              <a:rPr lang="ru-RU" b="0" i="0" dirty="0">
+                <a:effectLst/>
+                <a:latin typeface="-apple-system"/>
+              </a:rPr>
+              <a:t>Сколько игроков в бою превысили свои средние показатели по урону на используемом танке?</a:t>
+            </a:r>
+          </a:p>
+          <a:p>
+            <a:pPr algn="l">
+              <a:buFont typeface="+mj-lt"/>
+              <a:buAutoNum type="arabicPeriod"/>
+            </a:pPr>
+            <a:r>
+              <a:rPr lang="ru-RU" b="0" i="0" dirty="0">
+                <a:effectLst/>
+                <a:latin typeface="-apple-system"/>
+              </a:rPr>
+              <a:t>Какой из танков, представленных в бою, имеется у наибольшего числа игроков в статистике?</a:t>
+            </a:r>
+          </a:p>
+          <a:p>
+            <a:pPr algn="l">
+              <a:buFont typeface="+mj-lt"/>
+              <a:buAutoNum type="arabicPeriod"/>
+            </a:pPr>
+            <a:r>
+              <a:rPr lang="ru-RU" b="0" i="0" dirty="0">
+                <a:effectLst/>
+                <a:latin typeface="-apple-system"/>
+              </a:rPr>
+              <a:t>Какой самый популярный тип техники по сумме сыгранных боёв среди игроков?</a:t>
+            </a:r>
+          </a:p>
+          <a:p>
+            <a:pPr algn="l">
+              <a:buFont typeface="+mj-lt"/>
+              <a:buAutoNum type="arabicPeriod"/>
+            </a:pPr>
+            <a:r>
+              <a:rPr lang="ru-RU" b="0" i="0" dirty="0">
+                <a:effectLst/>
+                <a:latin typeface="-apple-system"/>
+              </a:rPr>
+              <a:t>Тяжелые танки какой нации наименее результативны?</a:t>
+            </a:r>
+          </a:p>
+          <a:p>
+            <a:pPr algn="l">
+              <a:buFont typeface="+mj-lt"/>
+              <a:buAutoNum type="arabicPeriod"/>
+            </a:pPr>
+            <a:r>
+              <a:rPr lang="ru-RU" b="0" i="0" dirty="0">
+                <a:effectLst/>
+                <a:latin typeface="-apple-system"/>
+              </a:rPr>
+              <a:t>Кто повалил больше всего деревьев в среднем за бой?</a:t>
+            </a:r>
+          </a:p>
+        </p:txBody>
+      </p:sp>
+    </p:spTree>
+    <p:extLst>
+      <p:ext uri="{BB962C8B-B14F-4D97-AF65-F5344CB8AC3E}">
+        <p14:creationId xmlns:p14="http://schemas.microsoft.com/office/powerpoint/2010/main" val="3013645081"/>
+      </p:ext>
+    </p:extLst>
+  </p:cSld>
+  <p:clrMapOvr>
+    <a:masterClrMapping/>
+  </p:clrMapOvr>
+</p:sld>
+</file>
+
+<file path=ppt/slides/slide8.xml><?xml version="1.0" encoding="utf-8"?>
+<p:sld xmlns:a="http://schemas.openxmlformats.org/drawingml/2006/main" xmlns:r="http://schemas.openxmlformats.org/officeDocument/2006/relationships" xmlns:p="http://schemas.openxmlformats.org/presentationml/2006/main">
+  <p:cSld>
+    <p:spTree>
+      <p:nvGrpSpPr>
+        <p:cNvPr id="1" name=""/>
+        <p:cNvGrpSpPr/>
+        <p:nvPr/>
+      </p:nvGrpSpPr>
+      <p:grpSpPr>
+        <a:xfrm>
+          <a:off x="0" y="0"/>
+          <a:ext cx="0" cy="0"/>
+          <a:chOff x="0" y="0"/>
+          <a:chExt cx="0" cy="0"/>
+        </a:xfrm>
+      </p:grpSpPr>
+      <p:sp>
+        <p:nvSpPr>
+          <p:cNvPr id="2" name="Заголовок 1">
+            <a:extLst>
+              <a:ext uri="{FF2B5EF4-FFF2-40B4-BE49-F238E27FC236}">
+                <a16:creationId xmlns:a16="http://schemas.microsoft.com/office/drawing/2014/main" id="{9FD8B6ED-77EE-5154-4C0A-137FC9A448BE}"/>
+              </a:ext>
+            </a:extLst>
+          </p:cNvPr>
+          <p:cNvSpPr>
+            <a:spLocks noGrp="1"/>
+          </p:cNvSpPr>
+          <p:nvPr>
+            <p:ph type="title"/>
+          </p:nvPr>
+        </p:nvSpPr>
+        <p:spPr/>
+        <p:txBody>
+          <a:bodyPr/>
+          <a:lstStyle/>
+          <a:p>
+            <a:r>
+              <a:rPr lang="en-US" dirty="0"/>
+              <a:t>SPARQL </a:t>
+            </a:r>
+            <a:r>
+              <a:rPr lang="ru-RU" dirty="0"/>
+              <a:t>запросы</a:t>
+            </a:r>
+          </a:p>
+        </p:txBody>
+      </p:sp>
+      <p:pic>
+        <p:nvPicPr>
+          <p:cNvPr id="5" name="Объект 4">
+            <a:extLst>
+              <a:ext uri="{FF2B5EF4-FFF2-40B4-BE49-F238E27FC236}">
+                <a16:creationId xmlns:a16="http://schemas.microsoft.com/office/drawing/2014/main" id="{1583017D-A77F-1CF2-9AA7-7CD3950871A7}"/>
+              </a:ext>
+            </a:extLst>
+          </p:cNvPr>
+          <p:cNvPicPr>
+            <a:picLocks noGrp="1" noChangeAspect="1"/>
+          </p:cNvPicPr>
+          <p:nvPr>
+            <p:ph idx="1"/>
+          </p:nvPr>
+        </p:nvPicPr>
+        <p:blipFill>
+          <a:blip r:embed="rId2"/>
+          <a:stretch>
+            <a:fillRect/>
+          </a:stretch>
+        </p:blipFill>
+        <p:spPr>
+          <a:xfrm>
+            <a:off x="2566766" y="1825625"/>
+            <a:ext cx="7058467" cy="4351338"/>
+          </a:xfrm>
+        </p:spPr>
+      </p:pic>
+    </p:spTree>
+    <p:extLst>
+      <p:ext uri="{BB962C8B-B14F-4D97-AF65-F5344CB8AC3E}">
+        <p14:creationId xmlns:p14="http://schemas.microsoft.com/office/powerpoint/2010/main" val="141604546"/>
+      </p:ext>
+    </p:extLst>
+  </p:cSld>
+  <p:clrMapOvr>
+    <a:masterClrMapping/>
+  </p:clrMapOvr>
+</p:sld>
+</file>
+
+<file path=ppt/slides/slide9.xml><?xml version="1.0" encoding="utf-8"?>
+<p:sld xmlns:a="http://schemas.openxmlformats.org/drawingml/2006/main" xmlns:r="http://schemas.openxmlformats.org/officeDocument/2006/relationships" xmlns:p="http://schemas.openxmlformats.org/presentationml/2006/main">
+  <p:cSld>
+    <p:spTree>
+      <p:nvGrpSpPr>
+        <p:cNvPr id="1" name=""/>
+        <p:cNvGrpSpPr/>
+        <p:nvPr/>
+      </p:nvGrpSpPr>
+      <p:grpSpPr>
+        <a:xfrm>
+          <a:off x="0" y="0"/>
+          <a:ext cx="0" cy="0"/>
+          <a:chOff x="0" y="0"/>
+          <a:chExt cx="0" cy="0"/>
+        </a:xfrm>
+      </p:grpSpPr>
+      <p:sp>
+        <p:nvSpPr>
+          <p:cNvPr id="2" name="Заголовок 1">
+            <a:extLst>
+              <a:ext uri="{FF2B5EF4-FFF2-40B4-BE49-F238E27FC236}">
+                <a16:creationId xmlns:a16="http://schemas.microsoft.com/office/drawing/2014/main" id="{9FD8B6ED-77EE-5154-4C0A-137FC9A448BE}"/>
+              </a:ext>
+            </a:extLst>
+          </p:cNvPr>
+          <p:cNvSpPr>
+            <a:spLocks noGrp="1"/>
+          </p:cNvSpPr>
+          <p:nvPr>
+            <p:ph type="title"/>
+          </p:nvPr>
+        </p:nvSpPr>
+        <p:spPr/>
+        <p:txBody>
+          <a:bodyPr/>
+          <a:lstStyle/>
+          <a:p>
+            <a:r>
+              <a:rPr lang="en-US" dirty="0"/>
+              <a:t>SPARQL </a:t>
+            </a:r>
+            <a:r>
+              <a:rPr lang="ru-RU" dirty="0"/>
+              <a:t>запросы</a:t>
+            </a:r>
+          </a:p>
+        </p:txBody>
+      </p:sp>
+      <p:pic>
+        <p:nvPicPr>
+          <p:cNvPr id="13" name="Объект 12">
+            <a:extLst>
+              <a:ext uri="{FF2B5EF4-FFF2-40B4-BE49-F238E27FC236}">
+                <a16:creationId xmlns:a16="http://schemas.microsoft.com/office/drawing/2014/main" id="{99C3DCFA-9A31-1894-264A-2E8DD27427B1}"/>
+              </a:ext>
+            </a:extLst>
+          </p:cNvPr>
+          <p:cNvPicPr>
+            <a:picLocks noGrp="1" noChangeAspect="1"/>
+          </p:cNvPicPr>
+          <p:nvPr>
+            <p:ph idx="1"/>
+          </p:nvPr>
+        </p:nvPicPr>
+        <p:blipFill>
+          <a:blip r:embed="rId2"/>
+          <a:stretch>
+            <a:fillRect/>
+          </a:stretch>
+        </p:blipFill>
+        <p:spPr>
+          <a:xfrm>
+            <a:off x="2066362" y="1967422"/>
+            <a:ext cx="8059275" cy="4067743"/>
+          </a:xfrm>
+        </p:spPr>
+      </p:pic>
+    </p:spTree>
+    <p:extLst>
+      <p:ext uri="{BB962C8B-B14F-4D97-AF65-F5344CB8AC3E}">
+        <p14:creationId xmlns:p14="http://schemas.microsoft.com/office/powerpoint/2010/main" val="1211966706"/>
       </p:ext>
     </p:extLst>
   </p:cSld>

</xml_diff>